<commit_message>
Created all mock objects. Added c-unit to testing directory. Added makefile to testing.
</commit_message>
<xml_diff>
--- a/Tps_Stories.pptx
+++ b/Tps_Stories.pptx
@@ -197,7 +197,7 @@
           <a:p>
             <a:fld id="{01C96086-7438-AE46-A320-EFC9ED254481}" type="datetimeFigureOut">
               <a:rPr lang="en-US" smtClean="0"/>
-              <a:t>10/29/18</a:t>
+              <a:t>10/30/18</a:t>
             </a:fld>
             <a:endParaRPr lang="en-US"/>
           </a:p>
@@ -730,7 +730,7 @@
           <a:p>
             <a:fld id="{EE067F8D-EA28-E349-8608-CCDA5E5EBE30}" type="datetimeFigureOut">
               <a:rPr lang="en-US" smtClean="0"/>
-              <a:t>10/29/18</a:t>
+              <a:t>10/30/18</a:t>
             </a:fld>
             <a:endParaRPr lang="en-US"/>
           </a:p>
@@ -900,7 +900,7 @@
           <a:p>
             <a:fld id="{EE067F8D-EA28-E349-8608-CCDA5E5EBE30}" type="datetimeFigureOut">
               <a:rPr lang="en-US" smtClean="0"/>
-              <a:t>10/29/18</a:t>
+              <a:t>10/30/18</a:t>
             </a:fld>
             <a:endParaRPr lang="en-US"/>
           </a:p>
@@ -1080,7 +1080,7 @@
           <a:p>
             <a:fld id="{EE067F8D-EA28-E349-8608-CCDA5E5EBE30}" type="datetimeFigureOut">
               <a:rPr lang="en-US" smtClean="0"/>
-              <a:t>10/29/18</a:t>
+              <a:t>10/30/18</a:t>
             </a:fld>
             <a:endParaRPr lang="en-US"/>
           </a:p>
@@ -1250,7 +1250,7 @@
           <a:p>
             <a:fld id="{EE067F8D-EA28-E349-8608-CCDA5E5EBE30}" type="datetimeFigureOut">
               <a:rPr lang="en-US" smtClean="0"/>
-              <a:t>10/29/18</a:t>
+              <a:t>10/30/18</a:t>
             </a:fld>
             <a:endParaRPr lang="en-US"/>
           </a:p>
@@ -1496,7 +1496,7 @@
           <a:p>
             <a:fld id="{EE067F8D-EA28-E349-8608-CCDA5E5EBE30}" type="datetimeFigureOut">
               <a:rPr lang="en-US" smtClean="0"/>
-              <a:t>10/29/18</a:t>
+              <a:t>10/30/18</a:t>
             </a:fld>
             <a:endParaRPr lang="en-US"/>
           </a:p>
@@ -1784,7 +1784,7 @@
           <a:p>
             <a:fld id="{EE067F8D-EA28-E349-8608-CCDA5E5EBE30}" type="datetimeFigureOut">
               <a:rPr lang="en-US" smtClean="0"/>
-              <a:t>10/29/18</a:t>
+              <a:t>10/30/18</a:t>
             </a:fld>
             <a:endParaRPr lang="en-US"/>
           </a:p>
@@ -2206,7 +2206,7 @@
           <a:p>
             <a:fld id="{EE067F8D-EA28-E349-8608-CCDA5E5EBE30}" type="datetimeFigureOut">
               <a:rPr lang="en-US" smtClean="0"/>
-              <a:t>10/29/18</a:t>
+              <a:t>10/30/18</a:t>
             </a:fld>
             <a:endParaRPr lang="en-US"/>
           </a:p>
@@ -2324,7 +2324,7 @@
           <a:p>
             <a:fld id="{EE067F8D-EA28-E349-8608-CCDA5E5EBE30}" type="datetimeFigureOut">
               <a:rPr lang="en-US" smtClean="0"/>
-              <a:t>10/29/18</a:t>
+              <a:t>10/30/18</a:t>
             </a:fld>
             <a:endParaRPr lang="en-US"/>
           </a:p>
@@ -2419,7 +2419,7 @@
           <a:p>
             <a:fld id="{EE067F8D-EA28-E349-8608-CCDA5E5EBE30}" type="datetimeFigureOut">
               <a:rPr lang="en-US" smtClean="0"/>
-              <a:t>10/29/18</a:t>
+              <a:t>10/30/18</a:t>
             </a:fld>
             <a:endParaRPr lang="en-US"/>
           </a:p>
@@ -2696,7 +2696,7 @@
           <a:p>
             <a:fld id="{EE067F8D-EA28-E349-8608-CCDA5E5EBE30}" type="datetimeFigureOut">
               <a:rPr lang="en-US" smtClean="0"/>
-              <a:t>10/29/18</a:t>
+              <a:t>10/30/18</a:t>
             </a:fld>
             <a:endParaRPr lang="en-US"/>
           </a:p>
@@ -2949,7 +2949,7 @@
           <a:p>
             <a:fld id="{EE067F8D-EA28-E349-8608-CCDA5E5EBE30}" type="datetimeFigureOut">
               <a:rPr lang="en-US" smtClean="0"/>
-              <a:t>10/29/18</a:t>
+              <a:t>10/30/18</a:t>
             </a:fld>
             <a:endParaRPr lang="en-US"/>
           </a:p>
@@ -3162,7 +3162,7 @@
           <a:p>
             <a:fld id="{EE067F8D-EA28-E349-8608-CCDA5E5EBE30}" type="datetimeFigureOut">
               <a:rPr lang="en-US" smtClean="0"/>
-              <a:t>10/29/18</a:t>
+              <a:t>10/30/18</a:t>
             </a:fld>
             <a:endParaRPr lang="en-US"/>
           </a:p>
@@ -4372,7 +4372,6 @@
               <a:rPr lang="en-US" dirty="0" smtClean="0"/>
               <a:t>Directory</a:t>
             </a:r>
-            <a:endParaRPr lang="en-US" dirty="0" smtClean="0"/>
           </a:p>
         </p:txBody>
       </p:sp>
@@ -5451,240 +5450,6 @@
       </p:sp>
       <p:sp>
         <p:nvSpPr>
-          <p:cNvPr id="3" name="TextBox 2"/>
-          <p:cNvSpPr txBox="1"/>
-          <p:nvPr/>
-        </p:nvSpPr>
-        <p:spPr>
-          <a:xfrm>
-            <a:off x="183602" y="5477226"/>
-            <a:ext cx="1897199" cy="923330"/>
-          </a:xfrm>
-          <a:prstGeom prst="rect">
-            <a:avLst/>
-          </a:prstGeom>
-          <a:noFill/>
-        </p:spPr>
-        <p:txBody>
-          <a:bodyPr wrap="none" rtlCol="0">
-            <a:spAutoFit/>
-          </a:bodyPr>
-          <a:lstStyle/>
-          <a:p>
-            <a:r>
-              <a:rPr lang="en-US" dirty="0" smtClean="0"/>
-              <a:t>Create new make</a:t>
-            </a:r>
-          </a:p>
-          <a:p>
-            <a:r>
-              <a:rPr lang="en-US" dirty="0"/>
-              <a:t>f</a:t>
-            </a:r>
-            <a:r>
-              <a:rPr lang="en-US" dirty="0" smtClean="0"/>
-              <a:t>ile since modified </a:t>
-            </a:r>
-          </a:p>
-          <a:p>
-            <a:r>
-              <a:rPr lang="en-US" dirty="0" smtClean="0"/>
-              <a:t>file structure</a:t>
-            </a:r>
-            <a:endParaRPr lang="en-US" dirty="0"/>
-          </a:p>
-        </p:txBody>
-      </p:sp>
-      <p:sp>
-        <p:nvSpPr>
-          <p:cNvPr id="5" name="TextBox 4"/>
-          <p:cNvSpPr txBox="1"/>
-          <p:nvPr/>
-        </p:nvSpPr>
-        <p:spPr>
-          <a:xfrm>
-            <a:off x="2157367" y="5752618"/>
-            <a:ext cx="646331" cy="369332"/>
-          </a:xfrm>
-          <a:prstGeom prst="rect">
-            <a:avLst/>
-          </a:prstGeom>
-          <a:noFill/>
-        </p:spPr>
-        <p:txBody>
-          <a:bodyPr wrap="none" rtlCol="0">
-            <a:spAutoFit/>
-          </a:bodyPr>
-          <a:lstStyle/>
-          <a:p>
-            <a:r>
-              <a:rPr lang="en-US" dirty="0" smtClean="0"/>
-              <a:t>1 </a:t>
-            </a:r>
-            <a:r>
-              <a:rPr lang="en-US" dirty="0" err="1" smtClean="0"/>
-              <a:t>hrs</a:t>
-            </a:r>
-            <a:endParaRPr lang="en-US" dirty="0"/>
-          </a:p>
-        </p:txBody>
-      </p:sp>
-      <p:sp>
-        <p:nvSpPr>
-          <p:cNvPr id="19" name="TextBox 18"/>
-          <p:cNvSpPr txBox="1"/>
-          <p:nvPr/>
-        </p:nvSpPr>
-        <p:spPr>
-          <a:xfrm>
-            <a:off x="3274311" y="5783215"/>
-            <a:ext cx="779330" cy="369332"/>
-          </a:xfrm>
-          <a:prstGeom prst="rect">
-            <a:avLst/>
-          </a:prstGeom>
-          <a:noFill/>
-        </p:spPr>
-        <p:txBody>
-          <a:bodyPr wrap="none" rtlCol="0">
-            <a:spAutoFit/>
-          </a:bodyPr>
-          <a:lstStyle/>
-          <a:p>
-            <a:r>
-              <a:rPr lang="en-US" dirty="0" smtClean="0"/>
-              <a:t>Daniel</a:t>
-            </a:r>
-            <a:endParaRPr lang="en-US" dirty="0"/>
-          </a:p>
-        </p:txBody>
-      </p:sp>
-      <p:sp>
-        <p:nvSpPr>
-          <p:cNvPr id="62" name="TextBox 61"/>
-          <p:cNvSpPr txBox="1"/>
-          <p:nvPr/>
-        </p:nvSpPr>
-        <p:spPr>
-          <a:xfrm>
-            <a:off x="4391252" y="5767915"/>
-            <a:ext cx="825867" cy="369332"/>
-          </a:xfrm>
-          <a:prstGeom prst="rect">
-            <a:avLst/>
-          </a:prstGeom>
-          <a:noFill/>
-        </p:spPr>
-        <p:txBody>
-          <a:bodyPr wrap="none" rtlCol="0">
-            <a:spAutoFit/>
-          </a:bodyPr>
-          <a:lstStyle/>
-          <a:p>
-            <a:r>
-              <a:rPr lang="en-US" dirty="0" smtClean="0"/>
-              <a:t>1.5 </a:t>
-            </a:r>
-            <a:r>
-              <a:rPr lang="en-US" dirty="0" err="1" smtClean="0"/>
-              <a:t>hrs</a:t>
-            </a:r>
-            <a:endParaRPr lang="en-US" dirty="0"/>
-          </a:p>
-        </p:txBody>
-      </p:sp>
-      <p:sp>
-        <p:nvSpPr>
-          <p:cNvPr id="63" name="TextBox 62"/>
-          <p:cNvSpPr txBox="1"/>
-          <p:nvPr/>
-        </p:nvSpPr>
-        <p:spPr>
-          <a:xfrm>
-            <a:off x="5920713" y="5783216"/>
-            <a:ext cx="301660" cy="369332"/>
-          </a:xfrm>
-          <a:prstGeom prst="rect">
-            <a:avLst/>
-          </a:prstGeom>
-          <a:noFill/>
-        </p:spPr>
-        <p:txBody>
-          <a:bodyPr wrap="none" rtlCol="0">
-            <a:spAutoFit/>
-          </a:bodyPr>
-          <a:lstStyle/>
-          <a:p>
-            <a:r>
-              <a:rPr lang="en-US" dirty="0" smtClean="0"/>
-              <a:t>0</a:t>
-            </a:r>
-            <a:endParaRPr lang="en-US" dirty="0"/>
-          </a:p>
-        </p:txBody>
-      </p:sp>
-      <p:sp>
-        <p:nvSpPr>
-          <p:cNvPr id="64" name="TextBox 63"/>
-          <p:cNvSpPr txBox="1"/>
-          <p:nvPr/>
-        </p:nvSpPr>
-        <p:spPr>
-          <a:xfrm>
-            <a:off x="6671035" y="5767914"/>
-            <a:ext cx="569387" cy="369332"/>
-          </a:xfrm>
-          <a:prstGeom prst="rect">
-            <a:avLst/>
-          </a:prstGeom>
-          <a:noFill/>
-        </p:spPr>
-        <p:txBody>
-          <a:bodyPr wrap="none" rtlCol="0">
-            <a:spAutoFit/>
-          </a:bodyPr>
-          <a:lstStyle/>
-          <a:p>
-            <a:r>
-              <a:rPr lang="en-US" dirty="0" smtClean="0"/>
-              <a:t>TBD</a:t>
-            </a:r>
-            <a:endParaRPr lang="en-US" dirty="0"/>
-          </a:p>
-        </p:txBody>
-      </p:sp>
-      <p:sp>
-        <p:nvSpPr>
-          <p:cNvPr id="65" name="TextBox 64"/>
-          <p:cNvSpPr txBox="1"/>
-          <p:nvPr/>
-        </p:nvSpPr>
-        <p:spPr>
-          <a:xfrm>
-            <a:off x="7910382" y="5767914"/>
-            <a:ext cx="569387" cy="369332"/>
-          </a:xfrm>
-          <a:prstGeom prst="rect">
-            <a:avLst/>
-          </a:prstGeom>
-          <a:noFill/>
-        </p:spPr>
-        <p:txBody>
-          <a:bodyPr wrap="none" rtlCol="0">
-            <a:spAutoFit/>
-          </a:bodyPr>
-          <a:lstStyle/>
-          <a:p>
-            <a:r>
-              <a:rPr lang="en-US" dirty="0" smtClean="0"/>
-              <a:t>TBD</a:t>
-            </a:r>
-            <a:endParaRPr lang="en-US" dirty="0"/>
-          </a:p>
-        </p:txBody>
-      </p:sp>
-      <p:sp>
-        <p:nvSpPr>
           <p:cNvPr id="66" name="TextBox 65"/>
           <p:cNvSpPr txBox="1"/>
           <p:nvPr/>
@@ -5710,6 +5475,242 @@
               <a:t>Quadratic Solve</a:t>
             </a:r>
             <a:endParaRPr lang="en-US" b="1" dirty="0"/>
+          </a:p>
+        </p:txBody>
+      </p:sp>
+      <p:sp>
+        <p:nvSpPr>
+          <p:cNvPr id="67" name="TextBox 66"/>
+          <p:cNvSpPr txBox="1"/>
+          <p:nvPr/>
+        </p:nvSpPr>
+        <p:spPr>
+          <a:xfrm>
+            <a:off x="182995" y="5476552"/>
+            <a:ext cx="1543511" cy="646331"/>
+          </a:xfrm>
+          <a:prstGeom prst="rect">
+            <a:avLst/>
+          </a:prstGeom>
+          <a:noFill/>
+        </p:spPr>
+        <p:txBody>
+          <a:bodyPr wrap="none" rtlCol="0">
+            <a:spAutoFit/>
+          </a:bodyPr>
+          <a:lstStyle/>
+          <a:p>
+            <a:r>
+              <a:rPr lang="en-US" dirty="0" smtClean="0"/>
+              <a:t>Create parsing</a:t>
+            </a:r>
+          </a:p>
+          <a:p>
+            <a:r>
+              <a:rPr lang="en-US" dirty="0" smtClean="0"/>
+              <a:t>mock </a:t>
+            </a:r>
+            <a:r>
+              <a:rPr lang="en-US" dirty="0" err="1" smtClean="0"/>
+              <a:t>obj</a:t>
+            </a:r>
+            <a:r>
+              <a:rPr lang="en-US" dirty="0" smtClean="0"/>
+              <a:t>(s)</a:t>
+            </a:r>
+            <a:endParaRPr lang="en-US" dirty="0"/>
+          </a:p>
+        </p:txBody>
+      </p:sp>
+      <p:sp>
+        <p:nvSpPr>
+          <p:cNvPr id="68" name="TextBox 67"/>
+          <p:cNvSpPr txBox="1"/>
+          <p:nvPr/>
+        </p:nvSpPr>
+        <p:spPr>
+          <a:xfrm>
+            <a:off x="2172678" y="5676058"/>
+            <a:ext cx="556563" cy="369332"/>
+          </a:xfrm>
+          <a:prstGeom prst="rect">
+            <a:avLst/>
+          </a:prstGeom>
+          <a:noFill/>
+        </p:spPr>
+        <p:txBody>
+          <a:bodyPr wrap="none" rtlCol="0">
+            <a:spAutoFit/>
+          </a:bodyPr>
+          <a:lstStyle/>
+          <a:p>
+            <a:r>
+              <a:rPr lang="en-US" dirty="0" smtClean="0"/>
+              <a:t>1 </a:t>
+            </a:r>
+            <a:r>
+              <a:rPr lang="en-US" dirty="0" err="1" smtClean="0"/>
+              <a:t>hr</a:t>
+            </a:r>
+            <a:endParaRPr lang="en-US" dirty="0"/>
+          </a:p>
+        </p:txBody>
+      </p:sp>
+      <p:sp>
+        <p:nvSpPr>
+          <p:cNvPr id="69" name="TextBox 68"/>
+          <p:cNvSpPr txBox="1"/>
+          <p:nvPr/>
+        </p:nvSpPr>
+        <p:spPr>
+          <a:xfrm>
+            <a:off x="4421863" y="5691357"/>
+            <a:ext cx="556563" cy="369332"/>
+          </a:xfrm>
+          <a:prstGeom prst="rect">
+            <a:avLst/>
+          </a:prstGeom>
+          <a:noFill/>
+        </p:spPr>
+        <p:txBody>
+          <a:bodyPr wrap="none" rtlCol="0">
+            <a:spAutoFit/>
+          </a:bodyPr>
+          <a:lstStyle/>
+          <a:p>
+            <a:r>
+              <a:rPr lang="en-US" dirty="0" smtClean="0"/>
+              <a:t>1 </a:t>
+            </a:r>
+            <a:r>
+              <a:rPr lang="en-US" dirty="0" err="1" smtClean="0"/>
+              <a:t>hr</a:t>
+            </a:r>
+            <a:endParaRPr lang="en-US" dirty="0"/>
+          </a:p>
+        </p:txBody>
+      </p:sp>
+      <p:sp>
+        <p:nvSpPr>
+          <p:cNvPr id="70" name="TextBox 69"/>
+          <p:cNvSpPr txBox="1"/>
+          <p:nvPr/>
+        </p:nvSpPr>
+        <p:spPr>
+          <a:xfrm>
+            <a:off x="3274316" y="5691359"/>
+            <a:ext cx="779330" cy="369332"/>
+          </a:xfrm>
+          <a:prstGeom prst="rect">
+            <a:avLst/>
+          </a:prstGeom>
+          <a:noFill/>
+        </p:spPr>
+        <p:txBody>
+          <a:bodyPr wrap="none" rtlCol="0">
+            <a:spAutoFit/>
+          </a:bodyPr>
+          <a:lstStyle/>
+          <a:p>
+            <a:r>
+              <a:rPr lang="en-US" dirty="0" smtClean="0"/>
+              <a:t>Daniel</a:t>
+            </a:r>
+            <a:endParaRPr lang="en-US" dirty="0"/>
+          </a:p>
+        </p:txBody>
+      </p:sp>
+      <p:sp>
+        <p:nvSpPr>
+          <p:cNvPr id="71" name="TextBox 70"/>
+          <p:cNvSpPr txBox="1"/>
+          <p:nvPr/>
+        </p:nvSpPr>
+        <p:spPr>
+          <a:xfrm>
+            <a:off x="5753008" y="5706661"/>
+            <a:ext cx="535648" cy="369332"/>
+          </a:xfrm>
+          <a:prstGeom prst="rect">
+            <a:avLst/>
+          </a:prstGeom>
+          <a:noFill/>
+        </p:spPr>
+        <p:txBody>
+          <a:bodyPr wrap="none" rtlCol="0">
+            <a:spAutoFit/>
+          </a:bodyPr>
+          <a:lstStyle/>
+          <a:p>
+            <a:r>
+              <a:rPr lang="en-US" dirty="0" smtClean="0"/>
+              <a:t>100</a:t>
+            </a:r>
+            <a:endParaRPr lang="en-US" dirty="0"/>
+          </a:p>
+        </p:txBody>
+      </p:sp>
+      <p:sp>
+        <p:nvSpPr>
+          <p:cNvPr id="72" name="TextBox 71"/>
+          <p:cNvSpPr txBox="1"/>
+          <p:nvPr/>
+        </p:nvSpPr>
+        <p:spPr>
+          <a:xfrm>
+            <a:off x="6701642" y="5706660"/>
+            <a:ext cx="730864" cy="369332"/>
+          </a:xfrm>
+          <a:prstGeom prst="rect">
+            <a:avLst/>
+          </a:prstGeom>
+          <a:noFill/>
+        </p:spPr>
+        <p:txBody>
+          <a:bodyPr wrap="none" rtlCol="0">
+            <a:spAutoFit/>
+          </a:bodyPr>
+          <a:lstStyle/>
+          <a:p>
+            <a:r>
+              <a:rPr lang="en-US" dirty="0" smtClean="0"/>
+              <a:t>1.5 </a:t>
+            </a:r>
+            <a:r>
+              <a:rPr lang="en-US" dirty="0" err="1" smtClean="0"/>
+              <a:t>hr</a:t>
+            </a:r>
+            <a:endParaRPr lang="en-US" dirty="0"/>
+          </a:p>
+        </p:txBody>
+      </p:sp>
+      <p:sp>
+        <p:nvSpPr>
+          <p:cNvPr id="73" name="TextBox 72"/>
+          <p:cNvSpPr txBox="1"/>
+          <p:nvPr/>
+        </p:nvSpPr>
+        <p:spPr>
+          <a:xfrm>
+            <a:off x="7925683" y="5706658"/>
+            <a:ext cx="455398" cy="369332"/>
+          </a:xfrm>
+          <a:prstGeom prst="rect">
+            <a:avLst/>
+          </a:prstGeom>
+          <a:noFill/>
+        </p:spPr>
+        <p:txBody>
+          <a:bodyPr wrap="none" rtlCol="0">
+            <a:spAutoFit/>
+          </a:bodyPr>
+          <a:lstStyle/>
+          <a:p>
+            <a:r>
+              <a:rPr lang="en-US" dirty="0" smtClean="0"/>
+              <a:t>No</a:t>
+            </a:r>
+            <a:endParaRPr lang="en-US" dirty="0"/>
           </a:p>
         </p:txBody>
       </p:sp>
@@ -6329,7 +6330,7 @@
         </p:nvCxnSpPr>
         <p:spPr>
           <a:xfrm>
-            <a:off x="105883" y="5319991"/>
+            <a:off x="105883" y="5427084"/>
             <a:ext cx="9006295" cy="44718"/>
           </a:xfrm>
           <a:prstGeom prst="line">
@@ -6447,7 +6448,10 @@
               <a:rPr lang="en-US" dirty="0" err="1" smtClean="0"/>
               <a:t>obj</a:t>
             </a:r>
-            <a:endParaRPr lang="en-US" dirty="0" smtClean="0"/>
+            <a:r>
+              <a:rPr lang="en-US" dirty="0" smtClean="0"/>
+              <a:t>(s)</a:t>
+            </a:r>
           </a:p>
         </p:txBody>
       </p:sp>
@@ -6926,62 +6930,13 @@
       </p:sp>
       <p:sp>
         <p:nvSpPr>
-          <p:cNvPr id="39" name="TextBox 38"/>
-          <p:cNvSpPr txBox="1"/>
-          <p:nvPr/>
-        </p:nvSpPr>
-        <p:spPr>
-          <a:xfrm>
-            <a:off x="244199" y="3732466"/>
-            <a:ext cx="1543511" cy="646331"/>
-          </a:xfrm>
-          <a:prstGeom prst="rect">
-            <a:avLst/>
-          </a:prstGeom>
-          <a:noFill/>
-        </p:spPr>
-        <p:txBody>
-          <a:bodyPr wrap="none" rtlCol="0">
-            <a:spAutoFit/>
-          </a:bodyPr>
-          <a:lstStyle/>
-          <a:p>
-            <a:r>
-              <a:rPr lang="en-US" dirty="0" smtClean="0"/>
-              <a:t>Create </a:t>
-            </a:r>
-            <a:r>
-              <a:rPr lang="en-US" dirty="0" smtClean="0"/>
-              <a:t>parsing</a:t>
-            </a:r>
-            <a:endParaRPr lang="en-US" dirty="0" smtClean="0"/>
-          </a:p>
-          <a:p>
-            <a:r>
-              <a:rPr lang="en-US" dirty="0" smtClean="0"/>
-              <a:t>mock </a:t>
-            </a:r>
-            <a:r>
-              <a:rPr lang="en-US" dirty="0" err="1" smtClean="0"/>
-              <a:t>obj</a:t>
-            </a:r>
-            <a:r>
-              <a:rPr lang="en-US" dirty="0" smtClean="0"/>
-              <a:t>(s)</a:t>
-            </a:r>
-            <a:endParaRPr lang="en-US" dirty="0"/>
-          </a:p>
-        </p:txBody>
-      </p:sp>
-      <p:sp>
-        <p:nvSpPr>
           <p:cNvPr id="18" name="TextBox 17"/>
           <p:cNvSpPr txBox="1"/>
           <p:nvPr/>
         </p:nvSpPr>
         <p:spPr>
           <a:xfrm>
-            <a:off x="229506" y="5461921"/>
+            <a:off x="229506" y="4498084"/>
             <a:ext cx="1830023" cy="923330"/>
           </a:xfrm>
           <a:prstGeom prst="rect">
@@ -7093,47 +7048,181 @@
       </p:sp>
       <p:sp>
         <p:nvSpPr>
+          <p:cNvPr id="46" name="TextBox 45"/>
+          <p:cNvSpPr txBox="1"/>
+          <p:nvPr/>
+        </p:nvSpPr>
+        <p:spPr>
+          <a:xfrm>
+            <a:off x="229512" y="3755720"/>
+            <a:ext cx="1415772" cy="646331"/>
+          </a:xfrm>
+          <a:prstGeom prst="rect">
+            <a:avLst/>
+          </a:prstGeom>
+          <a:noFill/>
+        </p:spPr>
+        <p:txBody>
+          <a:bodyPr wrap="none" rtlCol="0">
+            <a:spAutoFit/>
+          </a:bodyPr>
+          <a:lstStyle/>
+          <a:p>
+            <a:r>
+              <a:rPr lang="en-US" dirty="0" err="1" smtClean="0"/>
+              <a:t>Makefile</a:t>
+            </a:r>
+            <a:r>
+              <a:rPr lang="en-US" dirty="0" smtClean="0"/>
+              <a:t> for </a:t>
+            </a:r>
+          </a:p>
+          <a:p>
+            <a:r>
+              <a:rPr lang="en-US" dirty="0" smtClean="0"/>
+              <a:t>unit test </a:t>
+            </a:r>
+            <a:r>
+              <a:rPr lang="en-US" dirty="0" err="1" smtClean="0"/>
+              <a:t>objs</a:t>
+            </a:r>
+            <a:endParaRPr lang="en-US" dirty="0"/>
+          </a:p>
+        </p:txBody>
+      </p:sp>
+      <p:sp>
+        <p:nvSpPr>
+          <p:cNvPr id="25" name="TextBox 24"/>
+          <p:cNvSpPr txBox="1"/>
+          <p:nvPr/>
+        </p:nvSpPr>
+        <p:spPr>
+          <a:xfrm>
+            <a:off x="3320220" y="3075202"/>
+            <a:ext cx="779330" cy="369332"/>
+          </a:xfrm>
+          <a:prstGeom prst="rect">
+            <a:avLst/>
+          </a:prstGeom>
+          <a:noFill/>
+        </p:spPr>
+        <p:txBody>
+          <a:bodyPr wrap="none" rtlCol="0">
+            <a:spAutoFit/>
+          </a:bodyPr>
+          <a:lstStyle/>
+          <a:p>
+            <a:r>
+              <a:rPr lang="en-US" dirty="0" smtClean="0"/>
+              <a:t>Daniel</a:t>
+            </a:r>
+            <a:endParaRPr lang="en-US" dirty="0"/>
+          </a:p>
+        </p:txBody>
+      </p:sp>
+      <p:sp>
+        <p:nvSpPr>
           <p:cNvPr id="19" name="TextBox 18"/>
           <p:cNvSpPr txBox="1"/>
           <p:nvPr/>
         </p:nvSpPr>
         <p:spPr>
           <a:xfrm>
-            <a:off x="2172678" y="3962570"/>
-            <a:ext cx="556563" cy="369332"/>
-          </a:xfrm>
-          <a:prstGeom prst="rect">
-            <a:avLst/>
-          </a:prstGeom>
-          <a:noFill/>
-        </p:spPr>
-        <p:txBody>
-          <a:bodyPr wrap="none" rtlCol="0">
-            <a:spAutoFit/>
-          </a:bodyPr>
-          <a:lstStyle/>
-          <a:p>
-            <a:r>
-              <a:rPr lang="en-US" dirty="0" smtClean="0"/>
-              <a:t>1 </a:t>
+            <a:off x="5722407" y="3121105"/>
+            <a:ext cx="535648" cy="369332"/>
+          </a:xfrm>
+          <a:prstGeom prst="rect">
+            <a:avLst/>
+          </a:prstGeom>
+          <a:noFill/>
+        </p:spPr>
+        <p:txBody>
+          <a:bodyPr wrap="none" rtlCol="0">
+            <a:spAutoFit/>
+          </a:bodyPr>
+          <a:lstStyle/>
+          <a:p>
+            <a:r>
+              <a:rPr lang="en-US" dirty="0" smtClean="0"/>
+              <a:t>100</a:t>
+            </a:r>
+            <a:endParaRPr lang="en-US" dirty="0"/>
+          </a:p>
+        </p:txBody>
+      </p:sp>
+      <p:sp>
+        <p:nvSpPr>
+          <p:cNvPr id="20" name="TextBox 19"/>
+          <p:cNvSpPr txBox="1"/>
+          <p:nvPr/>
+        </p:nvSpPr>
+        <p:spPr>
+          <a:xfrm>
+            <a:off x="6686346" y="3121100"/>
+            <a:ext cx="730864" cy="369332"/>
+          </a:xfrm>
+          <a:prstGeom prst="rect">
+            <a:avLst/>
+          </a:prstGeom>
+          <a:noFill/>
+        </p:spPr>
+        <p:txBody>
+          <a:bodyPr wrap="none" rtlCol="0">
+            <a:spAutoFit/>
+          </a:bodyPr>
+          <a:lstStyle/>
+          <a:p>
+            <a:r>
+              <a:rPr lang="en-US" dirty="0" smtClean="0"/>
+              <a:t>1.5 </a:t>
             </a:r>
             <a:r>
               <a:rPr lang="en-US" dirty="0" err="1" smtClean="0"/>
               <a:t>hr</a:t>
             </a:r>
+            <a:endParaRPr lang="en-US" dirty="0" smtClean="0"/>
+          </a:p>
+        </p:txBody>
+      </p:sp>
+      <p:sp>
+        <p:nvSpPr>
+          <p:cNvPr id="21" name="TextBox 20"/>
+          <p:cNvSpPr txBox="1"/>
+          <p:nvPr/>
+        </p:nvSpPr>
+        <p:spPr>
+          <a:xfrm>
+            <a:off x="8002186" y="3121105"/>
+            <a:ext cx="455398" cy="369332"/>
+          </a:xfrm>
+          <a:prstGeom prst="rect">
+            <a:avLst/>
+          </a:prstGeom>
+          <a:noFill/>
+        </p:spPr>
+        <p:txBody>
+          <a:bodyPr wrap="none" rtlCol="0">
+            <a:spAutoFit/>
+          </a:bodyPr>
+          <a:lstStyle/>
+          <a:p>
+            <a:r>
+              <a:rPr lang="en-US" dirty="0" smtClean="0"/>
+              <a:t>No</a:t>
+            </a:r>
             <a:endParaRPr lang="en-US" dirty="0"/>
           </a:p>
         </p:txBody>
       </p:sp>
       <p:sp>
         <p:nvSpPr>
-          <p:cNvPr id="20" name="TextBox 19"/>
-          <p:cNvSpPr txBox="1"/>
-          <p:nvPr/>
-        </p:nvSpPr>
-        <p:spPr>
-          <a:xfrm>
-            <a:off x="4406562" y="3962570"/>
+          <p:cNvPr id="22" name="TextBox 21"/>
+          <p:cNvSpPr txBox="1"/>
+          <p:nvPr/>
+        </p:nvSpPr>
+        <p:spPr>
+          <a:xfrm>
+            <a:off x="2172678" y="3916674"/>
             <a:ext cx="556563" cy="369332"/>
           </a:xfrm>
           <a:prstGeom prst="rect">
@@ -7161,43 +7250,157 @@
       </p:sp>
       <p:sp>
         <p:nvSpPr>
-          <p:cNvPr id="46" name="TextBox 45"/>
-          <p:cNvSpPr txBox="1"/>
-          <p:nvPr/>
-        </p:nvSpPr>
-        <p:spPr>
-          <a:xfrm>
-            <a:off x="229512" y="4600938"/>
-            <a:ext cx="1558727" cy="646331"/>
-          </a:xfrm>
-          <a:prstGeom prst="rect">
-            <a:avLst/>
-          </a:prstGeom>
-          <a:noFill/>
-        </p:spPr>
-        <p:txBody>
-          <a:bodyPr wrap="none" rtlCol="0">
-            <a:spAutoFit/>
-          </a:bodyPr>
-          <a:lstStyle/>
-          <a:p>
+          <p:cNvPr id="23" name="TextBox 22"/>
+          <p:cNvSpPr txBox="1"/>
+          <p:nvPr/>
+        </p:nvSpPr>
+        <p:spPr>
+          <a:xfrm>
+            <a:off x="3320216" y="3931972"/>
+            <a:ext cx="779330" cy="369332"/>
+          </a:xfrm>
+          <a:prstGeom prst="rect">
+            <a:avLst/>
+          </a:prstGeom>
+          <a:noFill/>
+        </p:spPr>
+        <p:txBody>
+          <a:bodyPr wrap="none" rtlCol="0">
+            <a:spAutoFit/>
+          </a:bodyPr>
+          <a:lstStyle/>
+          <a:p>
+            <a:r>
+              <a:rPr lang="en-US" dirty="0" smtClean="0"/>
+              <a:t>Daniel</a:t>
+            </a:r>
+            <a:endParaRPr lang="en-US" dirty="0"/>
+          </a:p>
+        </p:txBody>
+      </p:sp>
+      <p:sp>
+        <p:nvSpPr>
+          <p:cNvPr id="24" name="TextBox 23"/>
+          <p:cNvSpPr txBox="1"/>
+          <p:nvPr/>
+        </p:nvSpPr>
+        <p:spPr>
+          <a:xfrm>
+            <a:off x="4406553" y="3962577"/>
+            <a:ext cx="556563" cy="369332"/>
+          </a:xfrm>
+          <a:prstGeom prst="rect">
+            <a:avLst/>
+          </a:prstGeom>
+          <a:noFill/>
+        </p:spPr>
+        <p:txBody>
+          <a:bodyPr wrap="none" rtlCol="0">
+            <a:spAutoFit/>
+          </a:bodyPr>
+          <a:lstStyle/>
+          <a:p>
+            <a:r>
+              <a:rPr lang="en-US" dirty="0" smtClean="0"/>
+              <a:t>1 </a:t>
+            </a:r>
             <a:r>
               <a:rPr lang="en-US" dirty="0" err="1" smtClean="0"/>
-              <a:t>Makefile</a:t>
-            </a:r>
-            <a:r>
-              <a:rPr lang="en-US" dirty="0" smtClean="0"/>
-              <a:t>(s) for </a:t>
-            </a:r>
-          </a:p>
-          <a:p>
-            <a:r>
-              <a:rPr lang="en-US" dirty="0" smtClean="0"/>
-              <a:t>unit test </a:t>
+              <a:t>hr</a:t>
+            </a:r>
+            <a:endParaRPr lang="en-US" dirty="0"/>
+          </a:p>
+        </p:txBody>
+      </p:sp>
+      <p:sp>
+        <p:nvSpPr>
+          <p:cNvPr id="26" name="TextBox 25"/>
+          <p:cNvSpPr txBox="1"/>
+          <p:nvPr/>
+        </p:nvSpPr>
+        <p:spPr>
+          <a:xfrm>
+            <a:off x="5737710" y="3962574"/>
+            <a:ext cx="418654" cy="369332"/>
+          </a:xfrm>
+          <a:prstGeom prst="rect">
+            <a:avLst/>
+          </a:prstGeom>
+          <a:noFill/>
+        </p:spPr>
+        <p:txBody>
+          <a:bodyPr wrap="none" rtlCol="0">
+            <a:spAutoFit/>
+          </a:bodyPr>
+          <a:lstStyle/>
+          <a:p>
+            <a:r>
+              <a:rPr lang="en-US" dirty="0" smtClean="0"/>
+              <a:t>90</a:t>
+            </a:r>
+            <a:endParaRPr lang="en-US" dirty="0"/>
+          </a:p>
+        </p:txBody>
+      </p:sp>
+      <p:sp>
+        <p:nvSpPr>
+          <p:cNvPr id="27" name="TextBox 26"/>
+          <p:cNvSpPr txBox="1"/>
+          <p:nvPr/>
+        </p:nvSpPr>
+        <p:spPr>
+          <a:xfrm>
+            <a:off x="6686345" y="3962573"/>
+            <a:ext cx="556563" cy="369332"/>
+          </a:xfrm>
+          <a:prstGeom prst="rect">
+            <a:avLst/>
+          </a:prstGeom>
+          <a:noFill/>
+        </p:spPr>
+        <p:txBody>
+          <a:bodyPr wrap="none" rtlCol="0">
+            <a:spAutoFit/>
+          </a:bodyPr>
+          <a:lstStyle/>
+          <a:p>
+            <a:r>
+              <a:rPr lang="en-US" dirty="0" smtClean="0"/>
+              <a:t>1 </a:t>
             </a:r>
             <a:r>
               <a:rPr lang="en-US" dirty="0" err="1" smtClean="0"/>
-              <a:t>obj’s</a:t>
+              <a:t>hr</a:t>
+            </a:r>
+            <a:endParaRPr lang="en-US" dirty="0"/>
+          </a:p>
+        </p:txBody>
+      </p:sp>
+      <p:sp>
+        <p:nvSpPr>
+          <p:cNvPr id="28" name="TextBox 27"/>
+          <p:cNvSpPr txBox="1"/>
+          <p:nvPr/>
+        </p:nvSpPr>
+        <p:spPr>
+          <a:xfrm>
+            <a:off x="8017495" y="3977873"/>
+            <a:ext cx="455398" cy="369332"/>
+          </a:xfrm>
+          <a:prstGeom prst="rect">
+            <a:avLst/>
+          </a:prstGeom>
+          <a:noFill/>
+        </p:spPr>
+        <p:txBody>
+          <a:bodyPr wrap="none" rtlCol="0">
+            <a:spAutoFit/>
+          </a:bodyPr>
+          <a:lstStyle/>
+          <a:p>
+            <a:r>
+              <a:rPr lang="en-US" dirty="0" smtClean="0"/>
+              <a:t>No</a:t>
             </a:r>
             <a:endParaRPr lang="en-US" dirty="0"/>
           </a:p>
@@ -7841,6 +8044,36 @@
           </a:fontRef>
         </p:style>
       </p:cxnSp>
+      <p:sp>
+        <p:nvSpPr>
+          <p:cNvPr id="24" name="TextBox 23"/>
+          <p:cNvSpPr txBox="1"/>
+          <p:nvPr/>
+        </p:nvSpPr>
+        <p:spPr>
+          <a:xfrm>
+            <a:off x="8284623" y="91812"/>
+            <a:ext cx="807170" cy="369332"/>
+          </a:xfrm>
+          <a:prstGeom prst="rect">
+            <a:avLst/>
+          </a:prstGeom>
+          <a:noFill/>
+        </p:spPr>
+        <p:txBody>
+          <a:bodyPr wrap="none" rtlCol="0">
+            <a:spAutoFit/>
+          </a:bodyPr>
+          <a:lstStyle/>
+          <a:p>
+            <a:r>
+              <a:rPr lang="en-US" dirty="0" smtClean="0"/>
+              <a:t>Page 3</a:t>
+            </a:r>
+            <a:endParaRPr lang="en-US" dirty="0"/>
+          </a:p>
+        </p:txBody>
+      </p:sp>
     </p:spTree>
     <p:extLst>
       <p:ext uri="{BB962C8B-B14F-4D97-AF65-F5344CB8AC3E}">
@@ -7939,7 +8172,7 @@
         </p:nvCxnSpPr>
         <p:spPr>
           <a:xfrm>
-            <a:off x="2887014" y="1007405"/>
+            <a:off x="2902315" y="1007405"/>
             <a:ext cx="30601" cy="5645515"/>
           </a:xfrm>
           <a:prstGeom prst="line">
@@ -9128,36 +9361,6 @@
           <a:chExt cx="0" cy="0"/>
         </a:xfrm>
       </p:grpSpPr>
-      <p:sp>
-        <p:nvSpPr>
-          <p:cNvPr id="4" name="TextBox 3"/>
-          <p:cNvSpPr txBox="1"/>
-          <p:nvPr/>
-        </p:nvSpPr>
-        <p:spPr>
-          <a:xfrm>
-            <a:off x="183607" y="107096"/>
-            <a:ext cx="305943" cy="369332"/>
-          </a:xfrm>
-          <a:prstGeom prst="rect">
-            <a:avLst/>
-          </a:prstGeom>
-          <a:noFill/>
-        </p:spPr>
-        <p:txBody>
-          <a:bodyPr wrap="none" rtlCol="0">
-            <a:spAutoFit/>
-          </a:bodyPr>
-          <a:lstStyle/>
-          <a:p>
-            <a:r>
-              <a:rPr lang="en-US" dirty="0" smtClean="0"/>
-              <a:t>b</a:t>
-            </a:r>
-            <a:endParaRPr lang="en-US" dirty="0"/>
-          </a:p>
-        </p:txBody>
-      </p:sp>
     </p:spTree>
     <p:extLst>
       <p:ext uri="{BB962C8B-B14F-4D97-AF65-F5344CB8AC3E}">

</xml_diff>

<commit_message>
Added t2, t3, t4. Modified README in directory "testing". Updated makefile and TPS_Stories.
</commit_message>
<xml_diff>
--- a/Tps_Stories.pptx
+++ b/Tps_Stories.pptx
@@ -197,7 +197,7 @@
           <a:p>
             <a:fld id="{01C96086-7438-AE46-A320-EFC9ED254481}" type="datetimeFigureOut">
               <a:rPr lang="en-US" smtClean="0"/>
-              <a:t>10/30/18</a:t>
+              <a:t>11/1/18</a:t>
             </a:fld>
             <a:endParaRPr lang="en-US"/>
           </a:p>
@@ -730,7 +730,7 @@
           <a:p>
             <a:fld id="{EE067F8D-EA28-E349-8608-CCDA5E5EBE30}" type="datetimeFigureOut">
               <a:rPr lang="en-US" smtClean="0"/>
-              <a:t>10/30/18</a:t>
+              <a:t>11/1/18</a:t>
             </a:fld>
             <a:endParaRPr lang="en-US"/>
           </a:p>
@@ -900,7 +900,7 @@
           <a:p>
             <a:fld id="{EE067F8D-EA28-E349-8608-CCDA5E5EBE30}" type="datetimeFigureOut">
               <a:rPr lang="en-US" smtClean="0"/>
-              <a:t>10/30/18</a:t>
+              <a:t>11/1/18</a:t>
             </a:fld>
             <a:endParaRPr lang="en-US"/>
           </a:p>
@@ -1080,7 +1080,7 @@
           <a:p>
             <a:fld id="{EE067F8D-EA28-E349-8608-CCDA5E5EBE30}" type="datetimeFigureOut">
               <a:rPr lang="en-US" smtClean="0"/>
-              <a:t>10/30/18</a:t>
+              <a:t>11/1/18</a:t>
             </a:fld>
             <a:endParaRPr lang="en-US"/>
           </a:p>
@@ -1250,7 +1250,7 @@
           <a:p>
             <a:fld id="{EE067F8D-EA28-E349-8608-CCDA5E5EBE30}" type="datetimeFigureOut">
               <a:rPr lang="en-US" smtClean="0"/>
-              <a:t>10/30/18</a:t>
+              <a:t>11/1/18</a:t>
             </a:fld>
             <a:endParaRPr lang="en-US"/>
           </a:p>
@@ -1496,7 +1496,7 @@
           <a:p>
             <a:fld id="{EE067F8D-EA28-E349-8608-CCDA5E5EBE30}" type="datetimeFigureOut">
               <a:rPr lang="en-US" smtClean="0"/>
-              <a:t>10/30/18</a:t>
+              <a:t>11/1/18</a:t>
             </a:fld>
             <a:endParaRPr lang="en-US"/>
           </a:p>
@@ -1784,7 +1784,7 @@
           <a:p>
             <a:fld id="{EE067F8D-EA28-E349-8608-CCDA5E5EBE30}" type="datetimeFigureOut">
               <a:rPr lang="en-US" smtClean="0"/>
-              <a:t>10/30/18</a:t>
+              <a:t>11/1/18</a:t>
             </a:fld>
             <a:endParaRPr lang="en-US"/>
           </a:p>
@@ -2206,7 +2206,7 @@
           <a:p>
             <a:fld id="{EE067F8D-EA28-E349-8608-CCDA5E5EBE30}" type="datetimeFigureOut">
               <a:rPr lang="en-US" smtClean="0"/>
-              <a:t>10/30/18</a:t>
+              <a:t>11/1/18</a:t>
             </a:fld>
             <a:endParaRPr lang="en-US"/>
           </a:p>
@@ -2324,7 +2324,7 @@
           <a:p>
             <a:fld id="{EE067F8D-EA28-E349-8608-CCDA5E5EBE30}" type="datetimeFigureOut">
               <a:rPr lang="en-US" smtClean="0"/>
-              <a:t>10/30/18</a:t>
+              <a:t>11/1/18</a:t>
             </a:fld>
             <a:endParaRPr lang="en-US"/>
           </a:p>
@@ -2419,7 +2419,7 @@
           <a:p>
             <a:fld id="{EE067F8D-EA28-E349-8608-CCDA5E5EBE30}" type="datetimeFigureOut">
               <a:rPr lang="en-US" smtClean="0"/>
-              <a:t>10/30/18</a:t>
+              <a:t>11/1/18</a:t>
             </a:fld>
             <a:endParaRPr lang="en-US"/>
           </a:p>
@@ -2696,7 +2696,7 @@
           <a:p>
             <a:fld id="{EE067F8D-EA28-E349-8608-CCDA5E5EBE30}" type="datetimeFigureOut">
               <a:rPr lang="en-US" smtClean="0"/>
-              <a:t>10/30/18</a:t>
+              <a:t>11/1/18</a:t>
             </a:fld>
             <a:endParaRPr lang="en-US"/>
           </a:p>
@@ -2949,7 +2949,7 @@
           <a:p>
             <a:fld id="{EE067F8D-EA28-E349-8608-CCDA5E5EBE30}" type="datetimeFigureOut">
               <a:rPr lang="en-US" smtClean="0"/>
-              <a:t>10/30/18</a:t>
+              <a:t>11/1/18</a:t>
             </a:fld>
             <a:endParaRPr lang="en-US"/>
           </a:p>
@@ -3162,7 +3162,7 @@
           <a:p>
             <a:fld id="{EE067F8D-EA28-E349-8608-CCDA5E5EBE30}" type="datetimeFigureOut">
               <a:rPr lang="en-US" smtClean="0"/>
-              <a:t>10/30/18</a:t>
+              <a:t>11/1/18</a:t>
             </a:fld>
             <a:endParaRPr lang="en-US"/>
           </a:p>
@@ -7321,22 +7321,22 @@
         <p:spPr>
           <a:xfrm>
             <a:off x="5737710" y="3962574"/>
-            <a:ext cx="418654" cy="369332"/>
-          </a:xfrm>
-          <a:prstGeom prst="rect">
-            <a:avLst/>
-          </a:prstGeom>
-          <a:noFill/>
-        </p:spPr>
-        <p:txBody>
-          <a:bodyPr wrap="none" rtlCol="0">
-            <a:spAutoFit/>
-          </a:bodyPr>
-          <a:lstStyle/>
-          <a:p>
-            <a:r>
-              <a:rPr lang="en-US" dirty="0" smtClean="0"/>
-              <a:t>90</a:t>
+            <a:ext cx="535648" cy="369332"/>
+          </a:xfrm>
+          <a:prstGeom prst="rect">
+            <a:avLst/>
+          </a:prstGeom>
+          <a:noFill/>
+        </p:spPr>
+        <p:txBody>
+          <a:bodyPr wrap="none" rtlCol="0">
+            <a:spAutoFit/>
+          </a:bodyPr>
+          <a:lstStyle/>
+          <a:p>
+            <a:r>
+              <a:rPr lang="en-US" dirty="0" smtClean="0"/>
+              <a:t>100</a:t>
             </a:r>
             <a:endParaRPr lang="en-US" dirty="0"/>
           </a:p>
@@ -7401,6 +7401,198 @@
             <a:r>
               <a:rPr lang="en-US" dirty="0" smtClean="0"/>
               <a:t>No</a:t>
+            </a:r>
+            <a:endParaRPr lang="en-US" dirty="0"/>
+          </a:p>
+        </p:txBody>
+      </p:sp>
+      <p:sp>
+        <p:nvSpPr>
+          <p:cNvPr id="29" name="TextBox 28"/>
+          <p:cNvSpPr txBox="1"/>
+          <p:nvPr/>
+        </p:nvSpPr>
+        <p:spPr>
+          <a:xfrm>
+            <a:off x="2187978" y="4804046"/>
+            <a:ext cx="646331" cy="369332"/>
+          </a:xfrm>
+          <a:prstGeom prst="rect">
+            <a:avLst/>
+          </a:prstGeom>
+          <a:noFill/>
+        </p:spPr>
+        <p:txBody>
+          <a:bodyPr wrap="none" rtlCol="0">
+            <a:spAutoFit/>
+          </a:bodyPr>
+          <a:lstStyle/>
+          <a:p>
+            <a:r>
+              <a:rPr lang="en-US" dirty="0" smtClean="0"/>
+              <a:t>2 </a:t>
+            </a:r>
+            <a:r>
+              <a:rPr lang="en-US" dirty="0" err="1" smtClean="0"/>
+              <a:t>hrs</a:t>
+            </a:r>
+            <a:endParaRPr lang="en-US" dirty="0"/>
+          </a:p>
+        </p:txBody>
+      </p:sp>
+      <p:sp>
+        <p:nvSpPr>
+          <p:cNvPr id="30" name="TextBox 29"/>
+          <p:cNvSpPr txBox="1"/>
+          <p:nvPr/>
+        </p:nvSpPr>
+        <p:spPr>
+          <a:xfrm>
+            <a:off x="3320219" y="4819344"/>
+            <a:ext cx="779330" cy="369332"/>
+          </a:xfrm>
+          <a:prstGeom prst="rect">
+            <a:avLst/>
+          </a:prstGeom>
+          <a:noFill/>
+        </p:spPr>
+        <p:txBody>
+          <a:bodyPr wrap="none" rtlCol="0">
+            <a:spAutoFit/>
+          </a:bodyPr>
+          <a:lstStyle/>
+          <a:p>
+            <a:r>
+              <a:rPr lang="en-US" dirty="0" smtClean="0"/>
+              <a:t>Daniel</a:t>
+            </a:r>
+            <a:endParaRPr lang="en-US" dirty="0"/>
+          </a:p>
+        </p:txBody>
+      </p:sp>
+      <p:sp>
+        <p:nvSpPr>
+          <p:cNvPr id="31" name="TextBox 30"/>
+          <p:cNvSpPr txBox="1"/>
+          <p:nvPr/>
+        </p:nvSpPr>
+        <p:spPr>
+          <a:xfrm>
+            <a:off x="4406555" y="4819346"/>
+            <a:ext cx="556563" cy="369332"/>
+          </a:xfrm>
+          <a:prstGeom prst="rect">
+            <a:avLst/>
+          </a:prstGeom>
+          <a:noFill/>
+        </p:spPr>
+        <p:txBody>
+          <a:bodyPr wrap="none" rtlCol="0">
+            <a:spAutoFit/>
+          </a:bodyPr>
+          <a:lstStyle/>
+          <a:p>
+            <a:r>
+              <a:rPr lang="en-US" dirty="0" smtClean="0"/>
+              <a:t>1 </a:t>
+            </a:r>
+            <a:r>
+              <a:rPr lang="en-US" dirty="0" err="1" smtClean="0"/>
+              <a:t>hr</a:t>
+            </a:r>
+            <a:endParaRPr lang="en-US" dirty="0"/>
+          </a:p>
+        </p:txBody>
+      </p:sp>
+      <p:sp>
+        <p:nvSpPr>
+          <p:cNvPr id="32" name="TextBox 31"/>
+          <p:cNvSpPr txBox="1"/>
+          <p:nvPr/>
+        </p:nvSpPr>
+        <p:spPr>
+          <a:xfrm>
+            <a:off x="5737705" y="4804043"/>
+            <a:ext cx="418654" cy="369332"/>
+          </a:xfrm>
+          <a:prstGeom prst="rect">
+            <a:avLst/>
+          </a:prstGeom>
+          <a:noFill/>
+        </p:spPr>
+        <p:txBody>
+          <a:bodyPr wrap="none" rtlCol="0">
+            <a:spAutoFit/>
+          </a:bodyPr>
+          <a:lstStyle/>
+          <a:p>
+            <a:r>
+              <a:rPr lang="en-US" dirty="0" smtClean="0"/>
+              <a:t>90</a:t>
+            </a:r>
+            <a:endParaRPr lang="en-US" dirty="0"/>
+          </a:p>
+        </p:txBody>
+      </p:sp>
+      <p:sp>
+        <p:nvSpPr>
+          <p:cNvPr id="33" name="TextBox 32"/>
+          <p:cNvSpPr txBox="1"/>
+          <p:nvPr/>
+        </p:nvSpPr>
+        <p:spPr>
+          <a:xfrm>
+            <a:off x="8017490" y="4834648"/>
+            <a:ext cx="455398" cy="369332"/>
+          </a:xfrm>
+          <a:prstGeom prst="rect">
+            <a:avLst/>
+          </a:prstGeom>
+          <a:noFill/>
+        </p:spPr>
+        <p:txBody>
+          <a:bodyPr wrap="none" rtlCol="0">
+            <a:spAutoFit/>
+          </a:bodyPr>
+          <a:lstStyle/>
+          <a:p>
+            <a:r>
+              <a:rPr lang="en-US" dirty="0" smtClean="0"/>
+              <a:t>No</a:t>
+            </a:r>
+            <a:endParaRPr lang="en-US" dirty="0"/>
+          </a:p>
+        </p:txBody>
+      </p:sp>
+      <p:sp>
+        <p:nvSpPr>
+          <p:cNvPr id="34" name="TextBox 33"/>
+          <p:cNvSpPr txBox="1"/>
+          <p:nvPr/>
+        </p:nvSpPr>
+        <p:spPr>
+          <a:xfrm>
+            <a:off x="6686345" y="4819348"/>
+            <a:ext cx="646331" cy="369332"/>
+          </a:xfrm>
+          <a:prstGeom prst="rect">
+            <a:avLst/>
+          </a:prstGeom>
+          <a:noFill/>
+        </p:spPr>
+        <p:txBody>
+          <a:bodyPr wrap="none" rtlCol="0">
+            <a:spAutoFit/>
+          </a:bodyPr>
+          <a:lstStyle/>
+          <a:p>
+            <a:r>
+              <a:rPr lang="en-US" dirty="0" smtClean="0"/>
+              <a:t>2 </a:t>
+            </a:r>
+            <a:r>
+              <a:rPr lang="en-US" dirty="0" err="1" smtClean="0"/>
+              <a:t>hrs</a:t>
             </a:r>
             <a:endParaRPr lang="en-US" dirty="0"/>
           </a:p>

</xml_diff>

<commit_message>
Updated TPS/Stories with TJ's name.
</commit_message>
<xml_diff>
--- a/Tps_Stories.pptx
+++ b/Tps_Stories.pptx
@@ -134,7 +134,7 @@
               <a:rPr b="0" lang="en-US" sz="1400" spc="-1" strike="noStrike">
                 <a:latin typeface="Times New Roman"/>
               </a:rPr>
-              <a:t>&lt;header&gt;</a:t>
+              <a:t> </a:t>
             </a:r>
             <a:endParaRPr b="0" lang="en-US" sz="1400" spc="-1" strike="noStrike">
               <a:latin typeface="Times New Roman"/>
@@ -169,7 +169,7 @@
               <a:rPr b="0" lang="en-US" sz="1400" spc="-1" strike="noStrike">
                 <a:latin typeface="Times New Roman"/>
               </a:rPr>
-              <a:t>&lt;date/time&gt;</a:t>
+              <a:t> </a:t>
             </a:r>
             <a:endParaRPr b="0" lang="en-US" sz="1400" spc="-1" strike="noStrike">
               <a:latin typeface="Times New Roman"/>
@@ -203,7 +203,7 @@
               <a:rPr b="0" lang="en-US" sz="1400" spc="-1" strike="noStrike">
                 <a:latin typeface="Times New Roman"/>
               </a:rPr>
-              <a:t>&lt;footer&gt;</a:t>
+              <a:t> </a:t>
             </a:r>
             <a:endParaRPr b="0" lang="en-US" sz="1400" spc="-1" strike="noStrike">
               <a:latin typeface="Times New Roman"/>
@@ -234,11 +234,11 @@
           <a:bodyPr lIns="0" rIns="0" tIns="0" bIns="0" anchor="b"/>
           <a:p>
             <a:pPr algn="r"/>
-            <a:fld id="{0D8F0E0A-CAC4-450B-9BB4-C29D0953469D}" type="slidenum">
+            <a:fld id="{AA555BC6-51FA-4767-8E56-4AD835B2C2FF}" type="slidenum">
               <a:rPr b="0" lang="en-US" sz="1400" spc="-1" strike="noStrike">
                 <a:latin typeface="Times New Roman"/>
               </a:rPr>
-              <a:t>&lt;number&gt;</a:t>
+              <a:t>1</a:t>
             </a:fld>
             <a:endParaRPr b="0" lang="en-US" sz="1400" spc="-1" strike="noStrike">
               <a:latin typeface="Times New Roman"/>
@@ -350,7 +350,7 @@
                 <a:spcPct val="100000"/>
               </a:lnSpc>
             </a:pPr>
-            <a:fld id="{E252593F-AC60-4967-BB03-FCEE5A7BFB95}" type="slidenum">
+            <a:fld id="{D534B645-3C70-4EDC-A8A2-F9806A731380}" type="slidenum">
               <a:rPr b="0" lang="en-US" sz="1200" spc="-1" strike="noStrike">
                 <a:solidFill>
                   <a:srgbClr val="000000"/>
@@ -5218,6 +5218,26 @@
                 <a:ea typeface="DejaVu Sans"/>
               </a:rPr>
               <a:t>Stephen Fedele</a:t>
+            </a:r>
+            <a:endParaRPr b="0" lang="en-US" sz="1800" spc="-1" strike="noStrike">
+              <a:latin typeface="Arial"/>
+            </a:endParaRPr>
+          </a:p>
+          <a:p>
+            <a:pPr algn="ctr">
+              <a:lnSpc>
+                <a:spcPct val="100000"/>
+              </a:lnSpc>
+            </a:pPr>
+            <a:r>
+              <a:rPr b="0" lang="en-US" sz="1800" spc="-1" strike="noStrike">
+                <a:solidFill>
+                  <a:srgbClr val="000000"/>
+                </a:solidFill>
+                <a:latin typeface="Arial"/>
+                <a:ea typeface="DejaVu Sans"/>
+              </a:rPr>
+              <a:t>Tim Curry</a:t>
             </a:r>
             <a:endParaRPr b="0" lang="en-US" sz="1800" spc="-1" strike="noStrike">
               <a:latin typeface="Arial"/>

</xml_diff>